<commit_message>
First draft sent to co-authors
</commit_message>
<xml_diff>
--- a/Bioinformatics/Pictures/litrePlots/N_P/SixPlots_MoveLegend.pptx
+++ b/Bioinformatics/Pictures/litrePlots/N_P/SixPlots_MoveLegend.pptx
@@ -6,6 +6,7 @@
   </p:sldMasterIdLst>
   <p:sldIdLst>
     <p:sldId id="256" r:id="rId2"/>
+    <p:sldId id="257" r:id="rId3"/>
   </p:sldIdLst>
   <p:sldSz cx="14570075" cy="18653125"/>
   <p:notesSz cx="6858000" cy="9144000"/>
@@ -3554,6 +3555,169 @@
 </p:sld>
 </file>
 
+<file path=ppt/slides/slide2.xml><?xml version="1.0" encoding="utf-8"?>
+<p:sld xmlns:a="http://schemas.openxmlformats.org/drawingml/2006/main" xmlns:r="http://schemas.openxmlformats.org/officeDocument/2006/relationships" xmlns:p="http://schemas.openxmlformats.org/presentationml/2006/main">
+  <p:cSld>
+    <p:spTree>
+      <p:nvGrpSpPr>
+        <p:cNvPr id="1" name=""/>
+        <p:cNvGrpSpPr/>
+        <p:nvPr/>
+      </p:nvGrpSpPr>
+      <p:grpSpPr>
+        <a:xfrm>
+          <a:off x="0" y="0"/>
+          <a:ext cx="0" cy="0"/>
+          <a:chOff x="0" y="0"/>
+          <a:chExt cx="0" cy="0"/>
+        </a:xfrm>
+      </p:grpSpPr>
+      <p:grpSp>
+        <p:nvGrpSpPr>
+          <p:cNvPr id="9" name="Group 8"/>
+          <p:cNvGrpSpPr/>
+          <p:nvPr/>
+        </p:nvGrpSpPr>
+        <p:grpSpPr>
+          <a:xfrm>
+            <a:off x="1938527" y="1664208"/>
+            <a:ext cx="10570465" cy="14635212"/>
+            <a:chOff x="1938527" y="1664208"/>
+            <a:chExt cx="10570465" cy="14635212"/>
+          </a:xfrm>
+        </p:grpSpPr>
+        <p:pic>
+          <p:nvPicPr>
+            <p:cNvPr id="4" name="Picture 3"/>
+            <p:cNvPicPr>
+              <a:picLocks noChangeAspect="1"/>
+            </p:cNvPicPr>
+            <p:nvPr/>
+          </p:nvPicPr>
+          <p:blipFill rotWithShape="1">
+            <a:blip r:embed="rId2">
+              <a:extLst>
+                <a:ext uri="{28A0092B-C50C-407E-A947-70E740481C1C}">
+                  <a14:useLocalDpi xmlns:a14="http://schemas.microsoft.com/office/drawing/2010/main" val="0"/>
+                </a:ext>
+              </a:extLst>
+            </a:blip>
+            <a:srcRect l="14" t="659" r="309" b="530"/>
+            <a:stretch/>
+          </p:blipFill>
+          <p:spPr>
+            <a:xfrm>
+              <a:off x="1938527" y="1664208"/>
+              <a:ext cx="10570465" cy="7300258"/>
+            </a:xfrm>
+            <a:prstGeom prst="rect">
+              <a:avLst/>
+            </a:prstGeom>
+          </p:spPr>
+        </p:pic>
+        <p:pic>
+          <p:nvPicPr>
+            <p:cNvPr id="5" name="Picture 4"/>
+            <p:cNvPicPr>
+              <a:picLocks noChangeAspect="1"/>
+            </p:cNvPicPr>
+            <p:nvPr/>
+          </p:nvPicPr>
+          <p:blipFill rotWithShape="1">
+            <a:blip r:embed="rId3">
+              <a:extLst>
+                <a:ext uri="{28A0092B-C50C-407E-A947-70E740481C1C}">
+                  <a14:useLocalDpi xmlns:a14="http://schemas.microsoft.com/office/drawing/2010/main" val="0"/>
+                </a:ext>
+              </a:extLst>
+            </a:blip>
+            <a:srcRect l="331" t="405" r="319" b="470"/>
+            <a:stretch/>
+          </p:blipFill>
+          <p:spPr>
+            <a:xfrm>
+              <a:off x="1938527" y="8964466"/>
+              <a:ext cx="10570465" cy="7334954"/>
+            </a:xfrm>
+            <a:prstGeom prst="rect">
+              <a:avLst/>
+            </a:prstGeom>
+          </p:spPr>
+        </p:pic>
+        <p:sp>
+          <p:nvSpPr>
+            <p:cNvPr id="6" name="TextBox 5"/>
+            <p:cNvSpPr txBox="1"/>
+            <p:nvPr/>
+          </p:nvSpPr>
+          <p:spPr>
+            <a:xfrm>
+              <a:off x="1938527" y="1664208"/>
+              <a:ext cx="465192" cy="646331"/>
+            </a:xfrm>
+            <a:prstGeom prst="rect">
+              <a:avLst/>
+            </a:prstGeom>
+            <a:noFill/>
+          </p:spPr>
+          <p:txBody>
+            <a:bodyPr wrap="none" rtlCol="0">
+              <a:spAutoFit/>
+            </a:bodyPr>
+            <a:lstStyle/>
+            <a:p>
+              <a:r>
+                <a:rPr lang="en-US" sz="3600" b="1" dirty="0" smtClean="0"/>
+                <a:t>A</a:t>
+              </a:r>
+              <a:endParaRPr lang="en-US" sz="3600" b="1" dirty="0"/>
+            </a:p>
+          </p:txBody>
+        </p:sp>
+        <p:sp>
+          <p:nvSpPr>
+            <p:cNvPr id="7" name="TextBox 6"/>
+            <p:cNvSpPr txBox="1"/>
+            <p:nvPr/>
+          </p:nvSpPr>
+          <p:spPr>
+            <a:xfrm>
+              <a:off x="1938527" y="8964466"/>
+              <a:ext cx="442750" cy="646331"/>
+            </a:xfrm>
+            <a:prstGeom prst="rect">
+              <a:avLst/>
+            </a:prstGeom>
+            <a:noFill/>
+          </p:spPr>
+          <p:txBody>
+            <a:bodyPr wrap="none" rtlCol="0">
+              <a:spAutoFit/>
+            </a:bodyPr>
+            <a:lstStyle/>
+            <a:p>
+              <a:r>
+                <a:rPr lang="en-US" sz="3600" b="1" dirty="0"/>
+                <a:t>B</a:t>
+              </a:r>
+              <a:endParaRPr lang="en-US" sz="3600" b="1" dirty="0"/>
+            </a:p>
+          </p:txBody>
+        </p:sp>
+      </p:grpSp>
+    </p:spTree>
+    <p:extLst>
+      <p:ext uri="{BB962C8B-B14F-4D97-AF65-F5344CB8AC3E}">
+        <p14:creationId xmlns:p14="http://schemas.microsoft.com/office/powerpoint/2010/main" val="1708557291"/>
+      </p:ext>
+    </p:extLst>
+  </p:cSld>
+  <p:clrMapOvr>
+    <a:masterClrMapping/>
+  </p:clrMapOvr>
+</p:sld>
+</file>
+
 <file path=ppt/theme/theme1.xml><?xml version="1.0" encoding="utf-8"?>
 <a:theme xmlns:a="http://schemas.openxmlformats.org/drawingml/2006/main" name="Office Theme">
   <a:themeElements>

</xml_diff>